<commit_message>
[~] Lecture9 [~] Lecture10
</commit_message>
<xml_diff>
--- a/Lectures/10.CISC_RISC_ARM/Lecture10.pptx
+++ b/Lectures/10.CISC_RISC_ARM/Lecture10.pptx
@@ -264,7 +264,7 @@
           <a:p>
             <a:fld id="{8A70136C-4900-4139-A65E-0FFE21BA8660}" type="datetimeFigureOut">
               <a:rPr lang="en-US" smtClean="0"/>
-              <a:t>12/16/2025</a:t>
+              <a:t>12/17/2025</a:t>
             </a:fld>
             <a:endParaRPr lang="en-US"/>
           </a:p>
@@ -6350,11 +6350,19 @@
             </a:r>
             <a:r>
               <a:rPr lang="en-US" sz="2000" dirty="0"/>
-              <a:t>/</a:t>
-            </a:r>
-            <a:r>
-              <a:rPr lang="ru-RU" sz="2000" dirty="0"/>
-              <a:t>атомарных типов С++ может приводить к трудноуловимым багам на </a:t>
+              <a:t> </a:t>
+            </a:r>
+            <a:r>
+              <a:rPr lang="ru-RU" sz="2000" dirty="0"/>
+              <a:t>вместо </a:t>
+            </a:r>
+            <a:r>
+              <a:rPr lang="ru-RU" sz="2000"/>
+              <a:t>атомарных типов в С</a:t>
+            </a:r>
+            <a:r>
+              <a:rPr lang="ru-RU" sz="2000" dirty="0"/>
+              <a:t>++ может приводить к трудноуловимым багам на </a:t>
             </a:r>
             <a:r>
               <a:rPr lang="en-US" sz="2000" dirty="0"/>
@@ -6396,10 +6404,10 @@
       </p:sp>
       <p:sp>
         <p:nvSpPr>
-          <p:cNvPr id="9" name="TextBox 8">
-            <a:extLst>
-              <a:ext uri="{FF2B5EF4-FFF2-40B4-BE49-F238E27FC236}">
-                <a16:creationId xmlns:a16="http://schemas.microsoft.com/office/drawing/2014/main" id="{1DE23417-2463-510A-34A2-92A623DB95D2}"/>
+          <p:cNvPr id="8" name="TextBox 7">
+            <a:extLst>
+              <a:ext uri="{FF2B5EF4-FFF2-40B4-BE49-F238E27FC236}">
+                <a16:creationId xmlns:a16="http://schemas.microsoft.com/office/drawing/2014/main" id="{4D75D687-FDA2-B656-701B-DA5D1D23FCFA}"/>
               </a:ext>
             </a:extLst>
           </p:cNvPr>
@@ -6408,8 +6416,8 @@
         </p:nvSpPr>
         <p:spPr>
           <a:xfrm>
-            <a:off x="4241800" y="5219184"/>
-            <a:ext cx="3594100" cy="369332"/>
+            <a:off x="3316381" y="4781550"/>
+            <a:ext cx="6094878" cy="369332"/>
           </a:xfrm>
           <a:prstGeom prst="rect">
             <a:avLst/>
@@ -6422,201 +6430,16 @@
           </a:bodyPr>
           <a:lstStyle/>
           <a:p>
-            <a:r>
-              <a:rPr lang="en-US" dirty="0">
+            <a:pPr algn="ctr"/>
+            <a:r>
+              <a:rPr lang="ru-RU" dirty="0">
                 <a:hlinkClick r:id="rId2"/>
               </a:rPr>
-              <a:t>https://godbolt.org/z/TeWcPdbsj</a:t>
-            </a:r>
-            <a:endParaRPr lang="ru-RU" dirty="0"/>
-          </a:p>
-        </p:txBody>
-      </p:sp>
-      <p:sp>
-        <p:nvSpPr>
-          <p:cNvPr id="11" name="TextBox 10">
-            <a:extLst>
-              <a:ext uri="{FF2B5EF4-FFF2-40B4-BE49-F238E27FC236}">
-                <a16:creationId xmlns:a16="http://schemas.microsoft.com/office/drawing/2014/main" id="{24F2E79F-C68D-93FD-7C3C-0F22DECC0197}"/>
-              </a:ext>
-            </a:extLst>
-          </p:cNvPr>
-          <p:cNvSpPr txBox="1"/>
-          <p:nvPr/>
-        </p:nvSpPr>
-        <p:spPr>
-          <a:xfrm>
-            <a:off x="8153400" y="5219184"/>
-            <a:ext cx="3365500" cy="369332"/>
-          </a:xfrm>
-          <a:prstGeom prst="rect">
-            <a:avLst/>
-          </a:prstGeom>
-          <a:noFill/>
-        </p:spPr>
-        <p:txBody>
-          <a:bodyPr wrap="square">
-            <a:spAutoFit/>
-          </a:bodyPr>
-          <a:lstStyle/>
-          <a:p>
-            <a:r>
-              <a:rPr lang="en-US" dirty="0">
-                <a:hlinkClick r:id="rId3"/>
-              </a:rPr>
-              <a:t>https://godbolt.org/z/MdcEo3cjf</a:t>
-            </a:r>
-            <a:endParaRPr lang="ru-RU" dirty="0"/>
-          </a:p>
-        </p:txBody>
-      </p:sp>
-      <p:sp>
-        <p:nvSpPr>
-          <p:cNvPr id="12" name="TextBox 11">
-            <a:extLst>
-              <a:ext uri="{FF2B5EF4-FFF2-40B4-BE49-F238E27FC236}">
-                <a16:creationId xmlns:a16="http://schemas.microsoft.com/office/drawing/2014/main" id="{77E2202C-40C0-D8DD-A277-54A510848838}"/>
-              </a:ext>
-            </a:extLst>
-          </p:cNvPr>
-          <p:cNvSpPr txBox="1"/>
-          <p:nvPr/>
-        </p:nvSpPr>
-        <p:spPr>
-          <a:xfrm>
-            <a:off x="581718" y="5219184"/>
-            <a:ext cx="3342582" cy="369332"/>
-          </a:xfrm>
-          <a:prstGeom prst="rect">
-            <a:avLst/>
-          </a:prstGeom>
-          <a:noFill/>
-        </p:spPr>
-        <p:txBody>
-          <a:bodyPr wrap="none" rtlCol="0">
-            <a:spAutoFit/>
-          </a:bodyPr>
-          <a:lstStyle/>
-          <a:p>
-            <a:r>
-              <a:rPr lang="en-US" dirty="0">
-                <a:hlinkClick r:id="rId4"/>
-              </a:rPr>
-              <a:t>https://godbolt.org/z/rfEcaq5hG</a:t>
-            </a:r>
-            <a:r>
-              <a:rPr lang="ru-RU" dirty="0"/>
+              <a:t>https://godbolt.org/z/6oPo16qKa</a:t>
+            </a:r>
+            <a:r>
+              <a:rPr lang="en-US" dirty="0"/>
               <a:t> </a:t>
-            </a:r>
-          </a:p>
-        </p:txBody>
-      </p:sp>
-      <p:sp>
-        <p:nvSpPr>
-          <p:cNvPr id="13" name="TextBox 12">
-            <a:extLst>
-              <a:ext uri="{FF2B5EF4-FFF2-40B4-BE49-F238E27FC236}">
-                <a16:creationId xmlns:a16="http://schemas.microsoft.com/office/drawing/2014/main" id="{F868DBF9-688E-4C80-673D-9643D157425F}"/>
-              </a:ext>
-            </a:extLst>
-          </p:cNvPr>
-          <p:cNvSpPr txBox="1"/>
-          <p:nvPr/>
-        </p:nvSpPr>
-        <p:spPr>
-          <a:xfrm>
-            <a:off x="1955800" y="4667250"/>
-            <a:ext cx="822661" cy="369332"/>
-          </a:xfrm>
-          <a:prstGeom prst="rect">
-            <a:avLst/>
-          </a:prstGeom>
-          <a:noFill/>
-        </p:spPr>
-        <p:txBody>
-          <a:bodyPr wrap="none" rtlCol="0">
-            <a:spAutoFit/>
-          </a:bodyPr>
-          <a:lstStyle/>
-          <a:p>
-            <a:r>
-              <a:rPr lang="en-US" dirty="0"/>
-              <a:t>x</a:t>
-            </a:r>
-            <a:r>
-              <a:rPr lang="ru-RU" dirty="0"/>
-              <a:t>86-64</a:t>
-            </a:r>
-          </a:p>
-        </p:txBody>
-      </p:sp>
-      <p:sp>
-        <p:nvSpPr>
-          <p:cNvPr id="14" name="TextBox 13">
-            <a:extLst>
-              <a:ext uri="{FF2B5EF4-FFF2-40B4-BE49-F238E27FC236}">
-                <a16:creationId xmlns:a16="http://schemas.microsoft.com/office/drawing/2014/main" id="{B295639B-DA4D-DF61-B048-A196746C3DA2}"/>
-              </a:ext>
-            </a:extLst>
-          </p:cNvPr>
-          <p:cNvSpPr txBox="1"/>
-          <p:nvPr/>
-        </p:nvSpPr>
-        <p:spPr>
-          <a:xfrm>
-            <a:off x="5718890" y="4667250"/>
-            <a:ext cx="639919" cy="369332"/>
-          </a:xfrm>
-          <a:prstGeom prst="rect">
-            <a:avLst/>
-          </a:prstGeom>
-          <a:noFill/>
-        </p:spPr>
-        <p:txBody>
-          <a:bodyPr wrap="none" rtlCol="0">
-            <a:spAutoFit/>
-          </a:bodyPr>
-          <a:lstStyle/>
-          <a:p>
-            <a:r>
-              <a:rPr lang="en-US" dirty="0"/>
-              <a:t>ARM</a:t>
-            </a:r>
-            <a:endParaRPr lang="ru-RU" dirty="0"/>
-          </a:p>
-        </p:txBody>
-      </p:sp>
-      <p:sp>
-        <p:nvSpPr>
-          <p:cNvPr id="15" name="TextBox 14">
-            <a:extLst>
-              <a:ext uri="{FF2B5EF4-FFF2-40B4-BE49-F238E27FC236}">
-                <a16:creationId xmlns:a16="http://schemas.microsoft.com/office/drawing/2014/main" id="{B5625B03-343C-4F15-65A8-5506636AF7BA}"/>
-              </a:ext>
-            </a:extLst>
-          </p:cNvPr>
-          <p:cNvSpPr txBox="1"/>
-          <p:nvPr/>
-        </p:nvSpPr>
-        <p:spPr>
-          <a:xfrm>
-            <a:off x="9342281" y="4667250"/>
-            <a:ext cx="958724" cy="369332"/>
-          </a:xfrm>
-          <a:prstGeom prst="rect">
-            <a:avLst/>
-          </a:prstGeom>
-          <a:noFill/>
-        </p:spPr>
-        <p:txBody>
-          <a:bodyPr wrap="none" rtlCol="0">
-            <a:spAutoFit/>
-          </a:bodyPr>
-          <a:lstStyle/>
-          <a:p>
-            <a:r>
-              <a:rPr lang="en-US" dirty="0"/>
-              <a:t>Aarch64</a:t>
             </a:r>
             <a:endParaRPr lang="ru-RU" dirty="0"/>
           </a:p>
@@ -7037,54 +6860,6 @@
       </p:pic>
       <p:sp>
         <p:nvSpPr>
-          <p:cNvPr id="8" name="TextBox 7">
-            <a:extLst>
-              <a:ext uri="{FF2B5EF4-FFF2-40B4-BE49-F238E27FC236}">
-                <a16:creationId xmlns:a16="http://schemas.microsoft.com/office/drawing/2014/main" id="{36DEBDE5-EE8E-5DFA-E5B5-08B0F47FBA09}"/>
-              </a:ext>
-            </a:extLst>
-          </p:cNvPr>
-          <p:cNvSpPr txBox="1"/>
-          <p:nvPr/>
-        </p:nvSpPr>
-        <p:spPr>
-          <a:xfrm>
-            <a:off x="450850" y="1923534"/>
-            <a:ext cx="3975100" cy="646331"/>
-          </a:xfrm>
-          <a:prstGeom prst="rect">
-            <a:avLst/>
-          </a:prstGeom>
-          <a:noFill/>
-        </p:spPr>
-        <p:txBody>
-          <a:bodyPr wrap="square">
-            <a:spAutoFit/>
-          </a:bodyPr>
-          <a:lstStyle/>
-          <a:p>
-            <a:r>
-              <a:rPr lang="en-US" dirty="0"/>
-              <a:t>X86-64 (CISC, superscalar)</a:t>
-            </a:r>
-          </a:p>
-          <a:p>
-            <a:r>
-              <a:rPr lang="ru-RU" dirty="0">
-                <a:hlinkClick r:id="rId3"/>
-              </a:rPr>
-              <a:t>https://godbolt.org/z/z9bKshrnG</a:t>
-            </a:r>
-            <a:r>
-              <a:rPr lang="en-US" dirty="0"/>
-              <a:t> </a:t>
-            </a:r>
-            <a:endParaRPr lang="ru-RU" dirty="0"/>
-          </a:p>
-        </p:txBody>
-      </p:sp>
-      <p:sp>
-        <p:nvSpPr>
           <p:cNvPr id="12" name="TextBox 11">
             <a:extLst>
               <a:ext uri="{FF2B5EF4-FFF2-40B4-BE49-F238E27FC236}">
@@ -7113,7 +6888,7 @@
           <a:p>
             <a:r>
               <a:rPr lang="en-US" dirty="0">
-                <a:hlinkClick r:id="rId4"/>
+                <a:hlinkClick r:id="rId3"/>
               </a:rPr>
               <a:t>source</a:t>
             </a:r>
@@ -7123,10 +6898,10 @@
       </p:sp>
       <p:sp>
         <p:nvSpPr>
-          <p:cNvPr id="13" name="TextBox 12">
-            <a:extLst>
-              <a:ext uri="{FF2B5EF4-FFF2-40B4-BE49-F238E27FC236}">
-                <a16:creationId xmlns:a16="http://schemas.microsoft.com/office/drawing/2014/main" id="{40B759A0-2877-A8D1-4DBE-0961654C0037}"/>
+          <p:cNvPr id="5" name="TextBox 4">
+            <a:extLst>
+              <a:ext uri="{FF2B5EF4-FFF2-40B4-BE49-F238E27FC236}">
+                <a16:creationId xmlns:a16="http://schemas.microsoft.com/office/drawing/2014/main" id="{A15C761F-75D3-318A-EEB4-FB926CC5FF3A}"/>
               </a:ext>
             </a:extLst>
           </p:cNvPr>
@@ -7135,8 +6910,8 @@
         </p:nvSpPr>
         <p:spPr>
           <a:xfrm>
-            <a:off x="520700" y="4267200"/>
-            <a:ext cx="3252814" cy="646331"/>
+            <a:off x="653863" y="3130312"/>
+            <a:ext cx="6094878" cy="369332"/>
           </a:xfrm>
           <a:prstGeom prst="rect">
             <a:avLst/>
@@ -7144,22 +6919,16 @@
           <a:noFill/>
         </p:spPr>
         <p:txBody>
-          <a:bodyPr wrap="none" rtlCol="0">
+          <a:bodyPr wrap="square">
             <a:spAutoFit/>
           </a:bodyPr>
           <a:lstStyle/>
           <a:p>
             <a:r>
-              <a:rPr lang="en-US" dirty="0"/>
-              <a:t>Qualcomm Hexagon (VLIW)</a:t>
-            </a:r>
-          </a:p>
-          <a:p>
-            <a:r>
-              <a:rPr lang="en-US" dirty="0">
-                <a:hlinkClick r:id="rId5"/>
+              <a:rPr lang="ru-RU" dirty="0">
+                <a:hlinkClick r:id="rId4"/>
               </a:rPr>
-              <a:t>https://godbolt.org/z/erx1vnj6d</a:t>
+              <a:t>https://godbolt.org/z/GdGbefdq1</a:t>
             </a:r>
             <a:r>
               <a:rPr lang="en-US" dirty="0"/>
@@ -9708,7 +9477,7 @@
               <a:rPr lang="en-US" sz="2000" dirty="0">
                 <a:hlinkClick r:id="rId2"/>
               </a:rPr>
-              <a:t>https://godbolt.org/z/8cz34PneT</a:t>
+              <a:t>https://godbolt.org/z/jshbK1qYz</a:t>
             </a:r>
             <a:r>
               <a:rPr lang="en-US" sz="2000" dirty="0"/>
@@ -9799,7 +9568,7 @@
               <a:rPr lang="en-US" sz="2000" dirty="0">
                 <a:hlinkClick r:id="rId3"/>
               </a:rPr>
-              <a:t>https://godbolt.org/z/rf5WWTaG8</a:t>
+              <a:t>https://godbolt.org/z/Pavv8GWoE</a:t>
             </a:r>
             <a:r>
               <a:rPr lang="ru-RU" sz="2000" dirty="0"/>

</xml_diff>